<commit_message>
Finished first iteration of the introductory chapter.
</commit_message>
<xml_diff>
--- a/prov-pieces.pptx
+++ b/prov-pieces.pptx
@@ -289,7 +289,7 @@
             <a:fld id="{3DD07BDF-5050-496A-AC36-D46A4EF33103}" type="datetimeFigureOut">
               <a:rPr lang="en-US" smtClean="0"/>
               <a:pPr/>
-              <a:t>11/6/2014</a:t>
+              <a:t>11/12/2014</a:t>
             </a:fld>
             <a:endParaRPr lang="en-US"/>
           </a:p>
@@ -456,7 +456,7 @@
             <a:fld id="{3DD07BDF-5050-496A-AC36-D46A4EF33103}" type="datetimeFigureOut">
               <a:rPr lang="en-US" smtClean="0"/>
               <a:pPr/>
-              <a:t>11/6/2014</a:t>
+              <a:t>11/12/2014</a:t>
             </a:fld>
             <a:endParaRPr lang="en-US"/>
           </a:p>
@@ -633,7 +633,7 @@
             <a:fld id="{3DD07BDF-5050-496A-AC36-D46A4EF33103}" type="datetimeFigureOut">
               <a:rPr lang="en-US" smtClean="0"/>
               <a:pPr/>
-              <a:t>11/6/2014</a:t>
+              <a:t>11/12/2014</a:t>
             </a:fld>
             <a:endParaRPr lang="en-US"/>
           </a:p>
@@ -800,7 +800,7 @@
             <a:fld id="{3DD07BDF-5050-496A-AC36-D46A4EF33103}" type="datetimeFigureOut">
               <a:rPr lang="en-US" smtClean="0"/>
               <a:pPr/>
-              <a:t>11/6/2014</a:t>
+              <a:t>11/12/2014</a:t>
             </a:fld>
             <a:endParaRPr lang="en-US"/>
           </a:p>
@@ -1043,7 +1043,7 @@
             <a:fld id="{3DD07BDF-5050-496A-AC36-D46A4EF33103}" type="datetimeFigureOut">
               <a:rPr lang="en-US" smtClean="0"/>
               <a:pPr/>
-              <a:t>11/6/2014</a:t>
+              <a:t>11/12/2014</a:t>
             </a:fld>
             <a:endParaRPr lang="en-US"/>
           </a:p>
@@ -1328,7 +1328,7 @@
             <a:fld id="{3DD07BDF-5050-496A-AC36-D46A4EF33103}" type="datetimeFigureOut">
               <a:rPr lang="en-US" smtClean="0"/>
               <a:pPr/>
-              <a:t>11/6/2014</a:t>
+              <a:t>11/12/2014</a:t>
             </a:fld>
             <a:endParaRPr lang="en-US"/>
           </a:p>
@@ -1747,7 +1747,7 @@
             <a:fld id="{3DD07BDF-5050-496A-AC36-D46A4EF33103}" type="datetimeFigureOut">
               <a:rPr lang="en-US" smtClean="0"/>
               <a:pPr/>
-              <a:t>11/6/2014</a:t>
+              <a:t>11/12/2014</a:t>
             </a:fld>
             <a:endParaRPr lang="en-US"/>
           </a:p>
@@ -1862,7 +1862,7 @@
             <a:fld id="{3DD07BDF-5050-496A-AC36-D46A4EF33103}" type="datetimeFigureOut">
               <a:rPr lang="en-US" smtClean="0"/>
               <a:pPr/>
-              <a:t>11/6/2014</a:t>
+              <a:t>11/12/2014</a:t>
             </a:fld>
             <a:endParaRPr lang="en-US"/>
           </a:p>
@@ -1954,7 +1954,7 @@
             <a:fld id="{3DD07BDF-5050-496A-AC36-D46A4EF33103}" type="datetimeFigureOut">
               <a:rPr lang="en-US" smtClean="0"/>
               <a:pPr/>
-              <a:t>11/6/2014</a:t>
+              <a:t>11/12/2014</a:t>
             </a:fld>
             <a:endParaRPr lang="en-US"/>
           </a:p>
@@ -2228,7 +2228,7 @@
             <a:fld id="{3DD07BDF-5050-496A-AC36-D46A4EF33103}" type="datetimeFigureOut">
               <a:rPr lang="en-US" smtClean="0"/>
               <a:pPr/>
-              <a:t>11/6/2014</a:t>
+              <a:t>11/12/2014</a:t>
             </a:fld>
             <a:endParaRPr lang="en-US"/>
           </a:p>
@@ -2478,7 +2478,7 @@
             <a:fld id="{3DD07BDF-5050-496A-AC36-D46A4EF33103}" type="datetimeFigureOut">
               <a:rPr lang="en-US" smtClean="0"/>
               <a:pPr/>
-              <a:t>11/6/2014</a:t>
+              <a:t>11/12/2014</a:t>
             </a:fld>
             <a:endParaRPr lang="en-US"/>
           </a:p>
@@ -2688,7 +2688,7 @@
             <a:fld id="{3DD07BDF-5050-496A-AC36-D46A4EF33103}" type="datetimeFigureOut">
               <a:rPr lang="en-US" smtClean="0"/>
               <a:pPr/>
-              <a:t>11/6/2014</a:t>
+              <a:t>11/12/2014</a:t>
             </a:fld>
             <a:endParaRPr lang="en-US"/>
           </a:p>
@@ -3534,8 +3534,8 @@
         </p:nvSpPr>
         <p:spPr>
           <a:xfrm rot="10800000">
-            <a:off x="381001" y="2508989"/>
-            <a:ext cx="461665" cy="564835"/>
+            <a:off x="381001" y="2552879"/>
+            <a:ext cx="461665" cy="477054"/>
           </a:xfrm>
           <a:prstGeom prst="rect">
             <a:avLst/>
@@ -3550,7 +3550,7 @@
           <a:p>
             <a:r>
               <a:rPr lang="en-US" dirty="0" smtClean="0"/>
-              <a:t>Excel</a:t>
+              <a:t>Calc</a:t>
             </a:r>
             <a:endParaRPr lang="en-US" dirty="0"/>
           </a:p>
@@ -3634,8 +3634,8 @@
         </p:nvSpPr>
         <p:spPr>
           <a:xfrm rot="10800000">
-            <a:off x="381000" y="1359863"/>
-            <a:ext cx="461665" cy="982641"/>
+            <a:off x="381000" y="1648371"/>
+            <a:ext cx="461665" cy="405624"/>
           </a:xfrm>
           <a:prstGeom prst="rect">
             <a:avLst/>
@@ -3650,7 +3650,7 @@
           <a:p>
             <a:r>
               <a:rPr lang="en-US" dirty="0" err="1" smtClean="0"/>
-              <a:t>Texmaker</a:t>
+              <a:t>LyX</a:t>
             </a:r>
             <a:endParaRPr lang="en-US" dirty="0"/>
           </a:p>

</xml_diff>